<commit_message>
results and plots updated to new version (_5perc)
</commit_message>
<xml_diff>
--- a/results_task4and9.pptx
+++ b/results_task4and9.pptx
@@ -68,8 +68,8 @@
         </p:nvSpPr>
         <p:spPr>
           <a:xfrm>
-            <a:off x="702000" y="696600"/>
-            <a:ext cx="6155280" cy="1785240"/>
+            <a:off x="377640" y="426240"/>
+            <a:ext cx="6803280" cy="1784880"/>
           </a:xfrm>
           <a:prstGeom prst="rect">
             <a:avLst/>
@@ -99,8 +99,8 @@
         </p:nvSpPr>
         <p:spPr>
           <a:xfrm>
-            <a:off x="702000" y="2692800"/>
-            <a:ext cx="6155280" cy="2758320"/>
+            <a:off x="377640" y="2501640"/>
+            <a:ext cx="6803280" cy="2957400"/>
           </a:xfrm>
           <a:prstGeom prst="rect">
             <a:avLst/>
@@ -129,8 +129,8 @@
         </p:nvSpPr>
         <p:spPr>
           <a:xfrm>
-            <a:off x="702000" y="5713560"/>
-            <a:ext cx="6155280" cy="2758320"/>
+            <a:off x="377640" y="5740560"/>
+            <a:ext cx="6803280" cy="2957400"/>
           </a:xfrm>
           <a:prstGeom prst="rect">
             <a:avLst/>
@@ -181,8 +181,8 @@
         </p:nvSpPr>
         <p:spPr>
           <a:xfrm>
-            <a:off x="702000" y="696600"/>
-            <a:ext cx="6155280" cy="1785240"/>
+            <a:off x="377640" y="426240"/>
+            <a:ext cx="6803280" cy="1784880"/>
           </a:xfrm>
           <a:prstGeom prst="rect">
             <a:avLst/>
@@ -212,8 +212,8 @@
         </p:nvSpPr>
         <p:spPr>
           <a:xfrm>
-            <a:off x="702000" y="2692800"/>
-            <a:ext cx="3003480" cy="2758320"/>
+            <a:off x="377640" y="2501640"/>
+            <a:ext cx="3319920" cy="2957400"/>
           </a:xfrm>
           <a:prstGeom prst="rect">
             <a:avLst/>
@@ -242,8 +242,8 @@
         </p:nvSpPr>
         <p:spPr>
           <a:xfrm>
-            <a:off x="3855960" y="2692800"/>
-            <a:ext cx="3003480" cy="2758320"/>
+            <a:off x="3863880" y="2501640"/>
+            <a:ext cx="3319920" cy="2957400"/>
           </a:xfrm>
           <a:prstGeom prst="rect">
             <a:avLst/>
@@ -272,8 +272,8 @@
         </p:nvSpPr>
         <p:spPr>
           <a:xfrm>
-            <a:off x="702000" y="5713560"/>
-            <a:ext cx="3003480" cy="2758320"/>
+            <a:off x="377640" y="5740560"/>
+            <a:ext cx="3319920" cy="2957400"/>
           </a:xfrm>
           <a:prstGeom prst="rect">
             <a:avLst/>
@@ -302,8 +302,8 @@
         </p:nvSpPr>
         <p:spPr>
           <a:xfrm>
-            <a:off x="3855960" y="5713560"/>
-            <a:ext cx="3003480" cy="2758320"/>
+            <a:off x="3863880" y="5740560"/>
+            <a:ext cx="3319920" cy="2957400"/>
           </a:xfrm>
           <a:prstGeom prst="rect">
             <a:avLst/>
@@ -354,8 +354,8 @@
         </p:nvSpPr>
         <p:spPr>
           <a:xfrm>
-            <a:off x="702000" y="696600"/>
-            <a:ext cx="6155280" cy="1785240"/>
+            <a:off x="377640" y="426240"/>
+            <a:ext cx="6803280" cy="1784880"/>
           </a:xfrm>
           <a:prstGeom prst="rect">
             <a:avLst/>
@@ -385,8 +385,8 @@
         </p:nvSpPr>
         <p:spPr>
           <a:xfrm>
-            <a:off x="702000" y="2692800"/>
-            <a:ext cx="1981800" cy="2758320"/>
+            <a:off x="377640" y="2501640"/>
+            <a:ext cx="2190240" cy="2957400"/>
           </a:xfrm>
           <a:prstGeom prst="rect">
             <a:avLst/>
@@ -415,8 +415,8 @@
         </p:nvSpPr>
         <p:spPr>
           <a:xfrm>
-            <a:off x="2783160" y="2692800"/>
-            <a:ext cx="1981800" cy="2758320"/>
+            <a:off x="2677680" y="2501640"/>
+            <a:ext cx="2190240" cy="2957400"/>
           </a:xfrm>
           <a:prstGeom prst="rect">
             <a:avLst/>
@@ -445,8 +445,8 @@
         </p:nvSpPr>
         <p:spPr>
           <a:xfrm>
-            <a:off x="4864680" y="2692800"/>
-            <a:ext cx="1981800" cy="2758320"/>
+            <a:off x="4978080" y="2501640"/>
+            <a:ext cx="2190240" cy="2957400"/>
           </a:xfrm>
           <a:prstGeom prst="rect">
             <a:avLst/>
@@ -475,8 +475,8 @@
         </p:nvSpPr>
         <p:spPr>
           <a:xfrm>
-            <a:off x="702000" y="5713560"/>
-            <a:ext cx="1981800" cy="2758320"/>
+            <a:off x="377640" y="5740560"/>
+            <a:ext cx="2190240" cy="2957400"/>
           </a:xfrm>
           <a:prstGeom prst="rect">
             <a:avLst/>
@@ -505,8 +505,8 @@
         </p:nvSpPr>
         <p:spPr>
           <a:xfrm>
-            <a:off x="2783160" y="5713560"/>
-            <a:ext cx="1981800" cy="2758320"/>
+            <a:off x="2677680" y="5740560"/>
+            <a:ext cx="2190240" cy="2957400"/>
           </a:xfrm>
           <a:prstGeom prst="rect">
             <a:avLst/>
@@ -535,8 +535,8 @@
         </p:nvSpPr>
         <p:spPr>
           <a:xfrm>
-            <a:off x="4864680" y="5713560"/>
-            <a:ext cx="1981800" cy="2758320"/>
+            <a:off x="4978080" y="5740560"/>
+            <a:ext cx="2190240" cy="2957400"/>
           </a:xfrm>
           <a:prstGeom prst="rect">
             <a:avLst/>
@@ -609,8 +609,8 @@
         </p:nvSpPr>
         <p:spPr>
           <a:xfrm>
-            <a:off x="702000" y="696600"/>
-            <a:ext cx="6155280" cy="1785240"/>
+            <a:off x="377640" y="426240"/>
+            <a:ext cx="6803280" cy="1784880"/>
           </a:xfrm>
           <a:prstGeom prst="rect">
             <a:avLst/>
@@ -640,8 +640,8 @@
         </p:nvSpPr>
         <p:spPr>
           <a:xfrm>
-            <a:off x="702000" y="2692800"/>
-            <a:ext cx="6155280" cy="5782680"/>
+            <a:off x="377640" y="2501640"/>
+            <a:ext cx="6803280" cy="6200640"/>
           </a:xfrm>
           <a:prstGeom prst="rect">
             <a:avLst/>
@@ -693,8 +693,8 @@
         </p:nvSpPr>
         <p:spPr>
           <a:xfrm>
-            <a:off x="702000" y="696600"/>
-            <a:ext cx="6155280" cy="1785240"/>
+            <a:off x="377640" y="426240"/>
+            <a:ext cx="6803280" cy="1784880"/>
           </a:xfrm>
           <a:prstGeom prst="rect">
             <a:avLst/>
@@ -724,8 +724,8 @@
         </p:nvSpPr>
         <p:spPr>
           <a:xfrm>
-            <a:off x="702000" y="2692800"/>
-            <a:ext cx="6155280" cy="5782680"/>
+            <a:off x="377640" y="2501640"/>
+            <a:ext cx="6803280" cy="6200640"/>
           </a:xfrm>
           <a:prstGeom prst="rect">
             <a:avLst/>
@@ -776,8 +776,8 @@
         </p:nvSpPr>
         <p:spPr>
           <a:xfrm>
-            <a:off x="702000" y="696600"/>
-            <a:ext cx="6155280" cy="1785240"/>
+            <a:off x="377640" y="426240"/>
+            <a:ext cx="6803280" cy="1784880"/>
           </a:xfrm>
           <a:prstGeom prst="rect">
             <a:avLst/>
@@ -807,8 +807,8 @@
         </p:nvSpPr>
         <p:spPr>
           <a:xfrm>
-            <a:off x="702000" y="2692800"/>
-            <a:ext cx="3003480" cy="5782680"/>
+            <a:off x="377640" y="2501640"/>
+            <a:ext cx="3319920" cy="6200640"/>
           </a:xfrm>
           <a:prstGeom prst="rect">
             <a:avLst/>
@@ -837,8 +837,8 @@
         </p:nvSpPr>
         <p:spPr>
           <a:xfrm>
-            <a:off x="3855960" y="2692800"/>
-            <a:ext cx="3003480" cy="5782680"/>
+            <a:off x="3863880" y="2501640"/>
+            <a:ext cx="3319920" cy="6200640"/>
           </a:xfrm>
           <a:prstGeom prst="rect">
             <a:avLst/>
@@ -889,8 +889,8 @@
         </p:nvSpPr>
         <p:spPr>
           <a:xfrm>
-            <a:off x="702000" y="696600"/>
-            <a:ext cx="6155280" cy="1785240"/>
+            <a:off x="377640" y="426240"/>
+            <a:ext cx="6803280" cy="1784880"/>
           </a:xfrm>
           <a:prstGeom prst="rect">
             <a:avLst/>
@@ -942,8 +942,8 @@
         </p:nvSpPr>
         <p:spPr>
           <a:xfrm>
-            <a:off x="702000" y="696600"/>
-            <a:ext cx="6155280" cy="8276760"/>
+            <a:off x="377640" y="426240"/>
+            <a:ext cx="6803280" cy="8274960"/>
           </a:xfrm>
           <a:prstGeom prst="rect">
             <a:avLst/>
@@ -995,8 +995,8 @@
         </p:nvSpPr>
         <p:spPr>
           <a:xfrm>
-            <a:off x="702000" y="696600"/>
-            <a:ext cx="6155280" cy="1785240"/>
+            <a:off x="377640" y="426240"/>
+            <a:ext cx="6803280" cy="1784880"/>
           </a:xfrm>
           <a:prstGeom prst="rect">
             <a:avLst/>
@@ -1026,8 +1026,8 @@
         </p:nvSpPr>
         <p:spPr>
           <a:xfrm>
-            <a:off x="702000" y="2692800"/>
-            <a:ext cx="3003480" cy="2758320"/>
+            <a:off x="377640" y="2501640"/>
+            <a:ext cx="3319920" cy="2957400"/>
           </a:xfrm>
           <a:prstGeom prst="rect">
             <a:avLst/>
@@ -1056,8 +1056,8 @@
         </p:nvSpPr>
         <p:spPr>
           <a:xfrm>
-            <a:off x="3855960" y="2692800"/>
-            <a:ext cx="3003480" cy="5782680"/>
+            <a:off x="3863880" y="2501640"/>
+            <a:ext cx="3319920" cy="6200640"/>
           </a:xfrm>
           <a:prstGeom prst="rect">
             <a:avLst/>
@@ -1086,8 +1086,8 @@
         </p:nvSpPr>
         <p:spPr>
           <a:xfrm>
-            <a:off x="702000" y="5713560"/>
-            <a:ext cx="3003480" cy="2758320"/>
+            <a:off x="377640" y="5740560"/>
+            <a:ext cx="3319920" cy="2957400"/>
           </a:xfrm>
           <a:prstGeom prst="rect">
             <a:avLst/>
@@ -1138,8 +1138,8 @@
         </p:nvSpPr>
         <p:spPr>
           <a:xfrm>
-            <a:off x="702000" y="696600"/>
-            <a:ext cx="6155280" cy="1785240"/>
+            <a:off x="377640" y="426240"/>
+            <a:ext cx="6803280" cy="1784880"/>
           </a:xfrm>
           <a:prstGeom prst="rect">
             <a:avLst/>
@@ -1169,8 +1169,8 @@
         </p:nvSpPr>
         <p:spPr>
           <a:xfrm>
-            <a:off x="702000" y="2692800"/>
-            <a:ext cx="6155280" cy="5782680"/>
+            <a:off x="377640" y="2501640"/>
+            <a:ext cx="6803280" cy="6200640"/>
           </a:xfrm>
           <a:prstGeom prst="rect">
             <a:avLst/>
@@ -1222,8 +1222,8 @@
         </p:nvSpPr>
         <p:spPr>
           <a:xfrm>
-            <a:off x="702000" y="696600"/>
-            <a:ext cx="6155280" cy="1785240"/>
+            <a:off x="377640" y="426240"/>
+            <a:ext cx="6803280" cy="1784880"/>
           </a:xfrm>
           <a:prstGeom prst="rect">
             <a:avLst/>
@@ -1253,8 +1253,8 @@
         </p:nvSpPr>
         <p:spPr>
           <a:xfrm>
-            <a:off x="702000" y="2692800"/>
-            <a:ext cx="3003480" cy="5782680"/>
+            <a:off x="377640" y="2501640"/>
+            <a:ext cx="3319920" cy="6200640"/>
           </a:xfrm>
           <a:prstGeom prst="rect">
             <a:avLst/>
@@ -1283,8 +1283,8 @@
         </p:nvSpPr>
         <p:spPr>
           <a:xfrm>
-            <a:off x="3855960" y="2692800"/>
-            <a:ext cx="3003480" cy="2758320"/>
+            <a:off x="3863880" y="2501640"/>
+            <a:ext cx="3319920" cy="2957400"/>
           </a:xfrm>
           <a:prstGeom prst="rect">
             <a:avLst/>
@@ -1313,8 +1313,8 @@
         </p:nvSpPr>
         <p:spPr>
           <a:xfrm>
-            <a:off x="3855960" y="5713560"/>
-            <a:ext cx="3003480" cy="2758320"/>
+            <a:off x="3863880" y="5740560"/>
+            <a:ext cx="3319920" cy="2957400"/>
           </a:xfrm>
           <a:prstGeom prst="rect">
             <a:avLst/>
@@ -1365,8 +1365,8 @@
         </p:nvSpPr>
         <p:spPr>
           <a:xfrm>
-            <a:off x="702000" y="696600"/>
-            <a:ext cx="6155280" cy="1785240"/>
+            <a:off x="377640" y="426240"/>
+            <a:ext cx="6803280" cy="1784880"/>
           </a:xfrm>
           <a:prstGeom prst="rect">
             <a:avLst/>
@@ -1396,8 +1396,8 @@
         </p:nvSpPr>
         <p:spPr>
           <a:xfrm>
-            <a:off x="702000" y="2692800"/>
-            <a:ext cx="3003480" cy="2758320"/>
+            <a:off x="377640" y="2501640"/>
+            <a:ext cx="3319920" cy="2957400"/>
           </a:xfrm>
           <a:prstGeom prst="rect">
             <a:avLst/>
@@ -1426,8 +1426,8 @@
         </p:nvSpPr>
         <p:spPr>
           <a:xfrm>
-            <a:off x="3855960" y="2692800"/>
-            <a:ext cx="3003480" cy="2758320"/>
+            <a:off x="3863880" y="2501640"/>
+            <a:ext cx="3319920" cy="2957400"/>
           </a:xfrm>
           <a:prstGeom prst="rect">
             <a:avLst/>
@@ -1456,8 +1456,8 @@
         </p:nvSpPr>
         <p:spPr>
           <a:xfrm>
-            <a:off x="702000" y="5713560"/>
-            <a:ext cx="6155280" cy="2758320"/>
+            <a:off x="377640" y="5740560"/>
+            <a:ext cx="6803280" cy="2957400"/>
           </a:xfrm>
           <a:prstGeom prst="rect">
             <a:avLst/>
@@ -1508,8 +1508,8 @@
         </p:nvSpPr>
         <p:spPr>
           <a:xfrm>
-            <a:off x="702000" y="696600"/>
-            <a:ext cx="6155280" cy="1785240"/>
+            <a:off x="377640" y="426240"/>
+            <a:ext cx="6803280" cy="1784880"/>
           </a:xfrm>
           <a:prstGeom prst="rect">
             <a:avLst/>
@@ -1539,8 +1539,8 @@
         </p:nvSpPr>
         <p:spPr>
           <a:xfrm>
-            <a:off x="702000" y="2692800"/>
-            <a:ext cx="6155280" cy="2758320"/>
+            <a:off x="377640" y="2501640"/>
+            <a:ext cx="6803280" cy="2957400"/>
           </a:xfrm>
           <a:prstGeom prst="rect">
             <a:avLst/>
@@ -1569,8 +1569,8 @@
         </p:nvSpPr>
         <p:spPr>
           <a:xfrm>
-            <a:off x="702000" y="5713560"/>
-            <a:ext cx="6155280" cy="2758320"/>
+            <a:off x="377640" y="5740560"/>
+            <a:ext cx="6803280" cy="2957400"/>
           </a:xfrm>
           <a:prstGeom prst="rect">
             <a:avLst/>
@@ -1621,8 +1621,8 @@
         </p:nvSpPr>
         <p:spPr>
           <a:xfrm>
-            <a:off x="702000" y="696600"/>
-            <a:ext cx="6155280" cy="1785240"/>
+            <a:off x="377640" y="426240"/>
+            <a:ext cx="6803280" cy="1784880"/>
           </a:xfrm>
           <a:prstGeom prst="rect">
             <a:avLst/>
@@ -1652,8 +1652,8 @@
         </p:nvSpPr>
         <p:spPr>
           <a:xfrm>
-            <a:off x="702000" y="2692800"/>
-            <a:ext cx="3003480" cy="2758320"/>
+            <a:off x="377640" y="2501640"/>
+            <a:ext cx="3319920" cy="2957400"/>
           </a:xfrm>
           <a:prstGeom prst="rect">
             <a:avLst/>
@@ -1682,8 +1682,8 @@
         </p:nvSpPr>
         <p:spPr>
           <a:xfrm>
-            <a:off x="3855960" y="2692800"/>
-            <a:ext cx="3003480" cy="2758320"/>
+            <a:off x="3863880" y="2501640"/>
+            <a:ext cx="3319920" cy="2957400"/>
           </a:xfrm>
           <a:prstGeom prst="rect">
             <a:avLst/>
@@ -1712,8 +1712,8 @@
         </p:nvSpPr>
         <p:spPr>
           <a:xfrm>
-            <a:off x="702000" y="5713560"/>
-            <a:ext cx="3003480" cy="2758320"/>
+            <a:off x="377640" y="5740560"/>
+            <a:ext cx="3319920" cy="2957400"/>
           </a:xfrm>
           <a:prstGeom prst="rect">
             <a:avLst/>
@@ -1742,8 +1742,8 @@
         </p:nvSpPr>
         <p:spPr>
           <a:xfrm>
-            <a:off x="3855960" y="5713560"/>
-            <a:ext cx="3003480" cy="2758320"/>
+            <a:off x="3863880" y="5740560"/>
+            <a:ext cx="3319920" cy="2957400"/>
           </a:xfrm>
           <a:prstGeom prst="rect">
             <a:avLst/>
@@ -1794,8 +1794,8 @@
         </p:nvSpPr>
         <p:spPr>
           <a:xfrm>
-            <a:off x="702000" y="696600"/>
-            <a:ext cx="6155280" cy="1785240"/>
+            <a:off x="377640" y="426240"/>
+            <a:ext cx="6803280" cy="1784880"/>
           </a:xfrm>
           <a:prstGeom prst="rect">
             <a:avLst/>
@@ -1825,8 +1825,8 @@
         </p:nvSpPr>
         <p:spPr>
           <a:xfrm>
-            <a:off x="702000" y="2692800"/>
-            <a:ext cx="1981800" cy="2758320"/>
+            <a:off x="377640" y="2501640"/>
+            <a:ext cx="2190240" cy="2957400"/>
           </a:xfrm>
           <a:prstGeom prst="rect">
             <a:avLst/>
@@ -1855,8 +1855,8 @@
         </p:nvSpPr>
         <p:spPr>
           <a:xfrm>
-            <a:off x="2783160" y="2692800"/>
-            <a:ext cx="1981800" cy="2758320"/>
+            <a:off x="2677680" y="2501640"/>
+            <a:ext cx="2190240" cy="2957400"/>
           </a:xfrm>
           <a:prstGeom prst="rect">
             <a:avLst/>
@@ -1885,8 +1885,8 @@
         </p:nvSpPr>
         <p:spPr>
           <a:xfrm>
-            <a:off x="4864680" y="2692800"/>
-            <a:ext cx="1981800" cy="2758320"/>
+            <a:off x="4978080" y="2501640"/>
+            <a:ext cx="2190240" cy="2957400"/>
           </a:xfrm>
           <a:prstGeom prst="rect">
             <a:avLst/>
@@ -1915,8 +1915,8 @@
         </p:nvSpPr>
         <p:spPr>
           <a:xfrm>
-            <a:off x="702000" y="5713560"/>
-            <a:ext cx="1981800" cy="2758320"/>
+            <a:off x="377640" y="5740560"/>
+            <a:ext cx="2190240" cy="2957400"/>
           </a:xfrm>
           <a:prstGeom prst="rect">
             <a:avLst/>
@@ -1945,8 +1945,8 @@
         </p:nvSpPr>
         <p:spPr>
           <a:xfrm>
-            <a:off x="2783160" y="5713560"/>
-            <a:ext cx="1981800" cy="2758320"/>
+            <a:off x="2677680" y="5740560"/>
+            <a:ext cx="2190240" cy="2957400"/>
           </a:xfrm>
           <a:prstGeom prst="rect">
             <a:avLst/>
@@ -1975,8 +1975,8 @@
         </p:nvSpPr>
         <p:spPr>
           <a:xfrm>
-            <a:off x="4864680" y="5713560"/>
-            <a:ext cx="1981800" cy="2758320"/>
+            <a:off x="4978080" y="5740560"/>
+            <a:ext cx="2190240" cy="2957400"/>
           </a:xfrm>
           <a:prstGeom prst="rect">
             <a:avLst/>
@@ -2027,8 +2027,8 @@
         </p:nvSpPr>
         <p:spPr>
           <a:xfrm>
-            <a:off x="702000" y="696600"/>
-            <a:ext cx="6155280" cy="1785240"/>
+            <a:off x="377640" y="426240"/>
+            <a:ext cx="6803280" cy="1784880"/>
           </a:xfrm>
           <a:prstGeom prst="rect">
             <a:avLst/>
@@ -2058,8 +2058,8 @@
         </p:nvSpPr>
         <p:spPr>
           <a:xfrm>
-            <a:off x="702000" y="2692800"/>
-            <a:ext cx="6155280" cy="5782680"/>
+            <a:off x="377640" y="2501640"/>
+            <a:ext cx="6803280" cy="6200640"/>
           </a:xfrm>
           <a:prstGeom prst="rect">
             <a:avLst/>
@@ -2110,8 +2110,8 @@
         </p:nvSpPr>
         <p:spPr>
           <a:xfrm>
-            <a:off x="702000" y="696600"/>
-            <a:ext cx="6155280" cy="1785240"/>
+            <a:off x="377640" y="426240"/>
+            <a:ext cx="6803280" cy="1784880"/>
           </a:xfrm>
           <a:prstGeom prst="rect">
             <a:avLst/>
@@ -2141,8 +2141,8 @@
         </p:nvSpPr>
         <p:spPr>
           <a:xfrm>
-            <a:off x="702000" y="2692800"/>
-            <a:ext cx="3003480" cy="5782680"/>
+            <a:off x="377640" y="2501640"/>
+            <a:ext cx="3319920" cy="6200640"/>
           </a:xfrm>
           <a:prstGeom prst="rect">
             <a:avLst/>
@@ -2171,8 +2171,8 @@
         </p:nvSpPr>
         <p:spPr>
           <a:xfrm>
-            <a:off x="3855960" y="2692800"/>
-            <a:ext cx="3003480" cy="5782680"/>
+            <a:off x="3863880" y="2501640"/>
+            <a:ext cx="3319920" cy="6200640"/>
           </a:xfrm>
           <a:prstGeom prst="rect">
             <a:avLst/>
@@ -2223,8 +2223,8 @@
         </p:nvSpPr>
         <p:spPr>
           <a:xfrm>
-            <a:off x="702000" y="696600"/>
-            <a:ext cx="6155280" cy="1785240"/>
+            <a:off x="377640" y="426240"/>
+            <a:ext cx="6803280" cy="1784880"/>
           </a:xfrm>
           <a:prstGeom prst="rect">
             <a:avLst/>
@@ -2276,8 +2276,8 @@
         </p:nvSpPr>
         <p:spPr>
           <a:xfrm>
-            <a:off x="702000" y="696600"/>
-            <a:ext cx="6155280" cy="8276760"/>
+            <a:off x="377640" y="426240"/>
+            <a:ext cx="6803280" cy="8274960"/>
           </a:xfrm>
           <a:prstGeom prst="rect">
             <a:avLst/>
@@ -2329,8 +2329,8 @@
         </p:nvSpPr>
         <p:spPr>
           <a:xfrm>
-            <a:off x="702000" y="696600"/>
-            <a:ext cx="6155280" cy="1785240"/>
+            <a:off x="377640" y="426240"/>
+            <a:ext cx="6803280" cy="1784880"/>
           </a:xfrm>
           <a:prstGeom prst="rect">
             <a:avLst/>
@@ -2360,8 +2360,8 @@
         </p:nvSpPr>
         <p:spPr>
           <a:xfrm>
-            <a:off x="702000" y="2692800"/>
-            <a:ext cx="3003480" cy="2758320"/>
+            <a:off x="377640" y="2501640"/>
+            <a:ext cx="3319920" cy="2957400"/>
           </a:xfrm>
           <a:prstGeom prst="rect">
             <a:avLst/>
@@ -2390,8 +2390,8 @@
         </p:nvSpPr>
         <p:spPr>
           <a:xfrm>
-            <a:off x="3855960" y="2692800"/>
-            <a:ext cx="3003480" cy="5782680"/>
+            <a:off x="3863880" y="2501640"/>
+            <a:ext cx="3319920" cy="6200640"/>
           </a:xfrm>
           <a:prstGeom prst="rect">
             <a:avLst/>
@@ -2420,8 +2420,8 @@
         </p:nvSpPr>
         <p:spPr>
           <a:xfrm>
-            <a:off x="702000" y="5713560"/>
-            <a:ext cx="3003480" cy="2758320"/>
+            <a:off x="377640" y="5740560"/>
+            <a:ext cx="3319920" cy="2957400"/>
           </a:xfrm>
           <a:prstGeom prst="rect">
             <a:avLst/>
@@ -2472,8 +2472,8 @@
         </p:nvSpPr>
         <p:spPr>
           <a:xfrm>
-            <a:off x="702000" y="696600"/>
-            <a:ext cx="6155280" cy="1785240"/>
+            <a:off x="377640" y="426240"/>
+            <a:ext cx="6803280" cy="1784880"/>
           </a:xfrm>
           <a:prstGeom prst="rect">
             <a:avLst/>
@@ -2503,8 +2503,8 @@
         </p:nvSpPr>
         <p:spPr>
           <a:xfrm>
-            <a:off x="702000" y="2692800"/>
-            <a:ext cx="3003480" cy="5782680"/>
+            <a:off x="377640" y="2501640"/>
+            <a:ext cx="3319920" cy="6200640"/>
           </a:xfrm>
           <a:prstGeom prst="rect">
             <a:avLst/>
@@ -2533,8 +2533,8 @@
         </p:nvSpPr>
         <p:spPr>
           <a:xfrm>
-            <a:off x="3855960" y="2692800"/>
-            <a:ext cx="3003480" cy="2758320"/>
+            <a:off x="3863880" y="2501640"/>
+            <a:ext cx="3319920" cy="2957400"/>
           </a:xfrm>
           <a:prstGeom prst="rect">
             <a:avLst/>
@@ -2563,8 +2563,8 @@
         </p:nvSpPr>
         <p:spPr>
           <a:xfrm>
-            <a:off x="3855960" y="5713560"/>
-            <a:ext cx="3003480" cy="2758320"/>
+            <a:off x="3863880" y="5740560"/>
+            <a:ext cx="3319920" cy="2957400"/>
           </a:xfrm>
           <a:prstGeom prst="rect">
             <a:avLst/>
@@ -2615,8 +2615,8 @@
         </p:nvSpPr>
         <p:spPr>
           <a:xfrm>
-            <a:off x="702000" y="696600"/>
-            <a:ext cx="6155280" cy="1785240"/>
+            <a:off x="377640" y="426240"/>
+            <a:ext cx="6803280" cy="1784880"/>
           </a:xfrm>
           <a:prstGeom prst="rect">
             <a:avLst/>
@@ -2646,8 +2646,8 @@
         </p:nvSpPr>
         <p:spPr>
           <a:xfrm>
-            <a:off x="702000" y="2692800"/>
-            <a:ext cx="3003480" cy="2758320"/>
+            <a:off x="377640" y="2501640"/>
+            <a:ext cx="3319920" cy="2957400"/>
           </a:xfrm>
           <a:prstGeom prst="rect">
             <a:avLst/>
@@ -2676,8 +2676,8 @@
         </p:nvSpPr>
         <p:spPr>
           <a:xfrm>
-            <a:off x="3855960" y="2692800"/>
-            <a:ext cx="3003480" cy="2758320"/>
+            <a:off x="3863880" y="2501640"/>
+            <a:ext cx="3319920" cy="2957400"/>
           </a:xfrm>
           <a:prstGeom prst="rect">
             <a:avLst/>
@@ -2706,8 +2706,8 @@
         </p:nvSpPr>
         <p:spPr>
           <a:xfrm>
-            <a:off x="702000" y="5713560"/>
-            <a:ext cx="6155280" cy="2758320"/>
+            <a:off x="377640" y="5740560"/>
+            <a:ext cx="6803280" cy="2957400"/>
           </a:xfrm>
           <a:prstGeom prst="rect">
             <a:avLst/>
@@ -2759,7 +2759,7 @@
         <p:spPr>
           <a:xfrm>
             <a:off x="702000" y="696600"/>
-            <a:ext cx="6155280" cy="1785240"/>
+            <a:ext cx="6154920" cy="1785240"/>
           </a:xfrm>
           <a:prstGeom prst="rect">
             <a:avLst/>
@@ -2774,7 +2774,283 @@
               <a:rPr b="0" lang="de-DE" sz="1800" spc="-1" strike="noStrike">
                 <a:latin typeface="Arial"/>
               </a:rPr>
-              <a:t>Format des Titeltextes durch Klicken bearbeiten</a:t>
+              <a:t>F</a:t>
+            </a:r>
+            <a:r>
+              <a:rPr b="0" lang="de-DE" sz="1800" spc="-1" strike="noStrike">
+                <a:latin typeface="Arial"/>
+              </a:rPr>
+              <a:t>o</a:t>
+            </a:r>
+            <a:r>
+              <a:rPr b="0" lang="de-DE" sz="1800" spc="-1" strike="noStrike">
+                <a:latin typeface="Arial"/>
+              </a:rPr>
+              <a:t>r</a:t>
+            </a:r>
+            <a:r>
+              <a:rPr b="0" lang="de-DE" sz="1800" spc="-1" strike="noStrike">
+                <a:latin typeface="Arial"/>
+              </a:rPr>
+              <a:t>m</a:t>
+            </a:r>
+            <a:r>
+              <a:rPr b="0" lang="de-DE" sz="1800" spc="-1" strike="noStrike">
+                <a:latin typeface="Arial"/>
+              </a:rPr>
+              <a:t>a</a:t>
+            </a:r>
+            <a:r>
+              <a:rPr b="0" lang="de-DE" sz="1800" spc="-1" strike="noStrike">
+                <a:latin typeface="Arial"/>
+              </a:rPr>
+              <a:t>t</a:t>
+            </a:r>
+            <a:r>
+              <a:rPr b="0" lang="de-DE" sz="1800" spc="-1" strike="noStrike">
+                <a:latin typeface="Arial"/>
+              </a:rPr>
+              <a:t> </a:t>
+            </a:r>
+            <a:r>
+              <a:rPr b="0" lang="de-DE" sz="1800" spc="-1" strike="noStrike">
+                <a:latin typeface="Arial"/>
+              </a:rPr>
+              <a:t>d</a:t>
+            </a:r>
+            <a:r>
+              <a:rPr b="0" lang="de-DE" sz="1800" spc="-1" strike="noStrike">
+                <a:latin typeface="Arial"/>
+              </a:rPr>
+              <a:t>e</a:t>
+            </a:r>
+            <a:r>
+              <a:rPr b="0" lang="de-DE" sz="1800" spc="-1" strike="noStrike">
+                <a:latin typeface="Arial"/>
+              </a:rPr>
+              <a:t>s</a:t>
+            </a:r>
+            <a:r>
+              <a:rPr b="0" lang="de-DE" sz="1800" spc="-1" strike="noStrike">
+                <a:latin typeface="Arial"/>
+              </a:rPr>
+              <a:t> </a:t>
+            </a:r>
+            <a:r>
+              <a:rPr b="0" lang="de-DE" sz="1800" spc="-1" strike="noStrike">
+                <a:latin typeface="Arial"/>
+              </a:rPr>
+              <a:t>T</a:t>
+            </a:r>
+            <a:r>
+              <a:rPr b="0" lang="de-DE" sz="1800" spc="-1" strike="noStrike">
+                <a:latin typeface="Arial"/>
+              </a:rPr>
+              <a:t>i</a:t>
+            </a:r>
+            <a:r>
+              <a:rPr b="0" lang="de-DE" sz="1800" spc="-1" strike="noStrike">
+                <a:latin typeface="Arial"/>
+              </a:rPr>
+              <a:t>t</a:t>
+            </a:r>
+            <a:r>
+              <a:rPr b="0" lang="de-DE" sz="1800" spc="-1" strike="noStrike">
+                <a:latin typeface="Arial"/>
+              </a:rPr>
+              <a:t>e</a:t>
+            </a:r>
+            <a:r>
+              <a:rPr b="0" lang="de-DE" sz="1800" spc="-1" strike="noStrike">
+                <a:latin typeface="Arial"/>
+              </a:rPr>
+              <a:t>l</a:t>
+            </a:r>
+            <a:r>
+              <a:rPr b="0" lang="de-DE" sz="1800" spc="-1" strike="noStrike">
+                <a:latin typeface="Arial"/>
+              </a:rPr>
+              <a:t>t</a:t>
+            </a:r>
+            <a:r>
+              <a:rPr b="0" lang="de-DE" sz="1800" spc="-1" strike="noStrike">
+                <a:latin typeface="Arial"/>
+              </a:rPr>
+              <a:t>e</a:t>
+            </a:r>
+            <a:r>
+              <a:rPr b="0" lang="de-DE" sz="1800" spc="-1" strike="noStrike">
+                <a:latin typeface="Arial"/>
+              </a:rPr>
+              <a:t>x</a:t>
+            </a:r>
+            <a:r>
+              <a:rPr b="0" lang="de-DE" sz="1800" spc="-1" strike="noStrike">
+                <a:latin typeface="Arial"/>
+              </a:rPr>
+              <a:t>t</a:t>
+            </a:r>
+            <a:r>
+              <a:rPr b="0" lang="de-DE" sz="1800" spc="-1" strike="noStrike">
+                <a:latin typeface="Arial"/>
+              </a:rPr>
+              <a:t>e</a:t>
+            </a:r>
+            <a:r>
+              <a:rPr b="0" lang="de-DE" sz="1800" spc="-1" strike="noStrike">
+                <a:latin typeface="Arial"/>
+              </a:rPr>
+              <a:t>s</a:t>
+            </a:r>
+            <a:r>
+              <a:rPr b="0" lang="de-DE" sz="1800" spc="-1" strike="noStrike">
+                <a:latin typeface="Arial"/>
+              </a:rPr>
+              <a:t> </a:t>
+            </a:r>
+            <a:r>
+              <a:rPr b="0" lang="de-DE" sz="1800" spc="-1" strike="noStrike">
+                <a:latin typeface="Arial"/>
+              </a:rPr>
+              <a:t>d</a:t>
+            </a:r>
+            <a:r>
+              <a:rPr b="0" lang="de-DE" sz="1800" spc="-1" strike="noStrike">
+                <a:latin typeface="Arial"/>
+              </a:rPr>
+              <a:t>u</a:t>
+            </a:r>
+            <a:r>
+              <a:rPr b="0" lang="de-DE" sz="1800" spc="-1" strike="noStrike">
+                <a:latin typeface="Arial"/>
+              </a:rPr>
+              <a:t>r</a:t>
+            </a:r>
+            <a:r>
+              <a:rPr b="0" lang="de-DE" sz="1800" spc="-1" strike="noStrike">
+                <a:latin typeface="Arial"/>
+              </a:rPr>
+              <a:t>c</a:t>
+            </a:r>
+            <a:r>
+              <a:rPr b="0" lang="de-DE" sz="1800" spc="-1" strike="noStrike">
+                <a:latin typeface="Arial"/>
+              </a:rPr>
+              <a:t>h</a:t>
+            </a:r>
+            <a:r>
+              <a:rPr b="0" lang="de-DE" sz="1800" spc="-1" strike="noStrike">
+                <a:latin typeface="Arial"/>
+              </a:rPr>
+              <a:t> </a:t>
+            </a:r>
+            <a:r>
+              <a:rPr b="0" lang="de-DE" sz="1800" spc="-1" strike="noStrike">
+                <a:latin typeface="Arial"/>
+              </a:rPr>
+              <a:t>K</a:t>
+            </a:r>
+            <a:r>
+              <a:rPr b="0" lang="de-DE" sz="1800" spc="-1" strike="noStrike">
+                <a:latin typeface="Arial"/>
+              </a:rPr>
+              <a:t>l</a:t>
+            </a:r>
+            <a:r>
+              <a:rPr b="0" lang="de-DE" sz="1800" spc="-1" strike="noStrike">
+                <a:latin typeface="Arial"/>
+              </a:rPr>
+              <a:t>i</a:t>
+            </a:r>
+            <a:r>
+              <a:rPr b="0" lang="de-DE" sz="1800" spc="-1" strike="noStrike">
+                <a:latin typeface="Arial"/>
+              </a:rPr>
+              <a:t>c</a:t>
+            </a:r>
+            <a:r>
+              <a:rPr b="0" lang="de-DE" sz="1800" spc="-1" strike="noStrike">
+                <a:latin typeface="Arial"/>
+              </a:rPr>
+              <a:t>k</a:t>
+            </a:r>
+            <a:r>
+              <a:rPr b="0" lang="de-DE" sz="1800" spc="-1" strike="noStrike">
+                <a:latin typeface="Arial"/>
+              </a:rPr>
+              <a:t>e</a:t>
+            </a:r>
+            <a:r>
+              <a:rPr b="0" lang="de-DE" sz="1800" spc="-1" strike="noStrike">
+                <a:latin typeface="Arial"/>
+              </a:rPr>
+              <a:t>n</a:t>
+            </a:r>
+            <a:r>
+              <a:rPr b="0" lang="de-DE" sz="1800" spc="-1" strike="noStrike">
+                <a:latin typeface="Arial"/>
+              </a:rPr>
+              <a:t> </a:t>
+            </a:r>
+            <a:r>
+              <a:rPr b="0" lang="de-DE" sz="1800" spc="-1" strike="noStrike">
+                <a:latin typeface="Arial"/>
+              </a:rPr>
+              <a:t>b</a:t>
+            </a:r>
+            <a:r>
+              <a:rPr b="0" lang="de-DE" sz="1800" spc="-1" strike="noStrike">
+                <a:latin typeface="Arial"/>
+              </a:rPr>
+              <a:t>e</a:t>
+            </a:r>
+            <a:r>
+              <a:rPr b="0" lang="de-DE" sz="1800" spc="-1" strike="noStrike">
+                <a:latin typeface="Arial"/>
+              </a:rPr>
+              <a:t>a</a:t>
+            </a:r>
+            <a:r>
+              <a:rPr b="0" lang="de-DE" sz="1800" spc="-1" strike="noStrike">
+                <a:latin typeface="Arial"/>
+              </a:rPr>
+              <a:t>r</a:t>
+            </a:r>
+            <a:r>
+              <a:rPr b="0" lang="de-DE" sz="1800" spc="-1" strike="noStrike">
+                <a:latin typeface="Arial"/>
+              </a:rPr>
+              <a:t>b</a:t>
+            </a:r>
+            <a:r>
+              <a:rPr b="0" lang="de-DE" sz="1800" spc="-1" strike="noStrike">
+                <a:latin typeface="Arial"/>
+              </a:rPr>
+              <a:t>e</a:t>
+            </a:r>
+            <a:r>
+              <a:rPr b="0" lang="de-DE" sz="1800" spc="-1" strike="noStrike">
+                <a:latin typeface="Arial"/>
+              </a:rPr>
+              <a:t>i</a:t>
+            </a:r>
+            <a:r>
+              <a:rPr b="0" lang="de-DE" sz="1800" spc="-1" strike="noStrike">
+                <a:latin typeface="Arial"/>
+              </a:rPr>
+              <a:t>t</a:t>
+            </a:r>
+            <a:r>
+              <a:rPr b="0" lang="de-DE" sz="1800" spc="-1" strike="noStrike">
+                <a:latin typeface="Arial"/>
+              </a:rPr>
+              <a:t>e</a:t>
+            </a:r>
+            <a:r>
+              <a:rPr b="0" lang="de-DE" sz="1800" spc="-1" strike="noStrike">
+                <a:latin typeface="Arial"/>
+              </a:rPr>
+              <a:t>n</a:t>
             </a:r>
             <a:endParaRPr b="0" lang="de-DE" sz="1800" spc="-1" strike="noStrike">
               <a:latin typeface="Arial"/>
@@ -2794,8 +3070,8 @@
         </p:nvSpPr>
         <p:spPr>
           <a:xfrm>
-            <a:off x="377640" y="2501640"/>
-            <a:ext cx="6803280" cy="6200640"/>
+            <a:off x="702000" y="2692800"/>
+            <a:ext cx="6154920" cy="5782320"/>
           </a:xfrm>
           <a:prstGeom prst="rect">
             <a:avLst/>
@@ -2818,12 +3094,12 @@
               <a:buChar char=""/>
             </a:pPr>
             <a:r>
-              <a:rPr b="0" lang="de-DE" sz="3200" spc="-1" strike="noStrike">
+              <a:rPr b="0" lang="de-DE" sz="1800" spc="-1" strike="noStrike">
                 <a:latin typeface="Arial"/>
               </a:rPr>
               <a:t>Format des Gliederungstextes durch Klicken bearbeiten</a:t>
             </a:r>
-            <a:endParaRPr b="0" lang="de-DE" sz="3200" spc="-1" strike="noStrike">
+            <a:endParaRPr b="0" lang="de-DE" sz="1800" spc="-1" strike="noStrike">
               <a:latin typeface="Arial"/>
             </a:endParaRPr>
           </a:p>
@@ -2840,12 +3116,12 @@
               <a:buChar char=""/>
             </a:pPr>
             <a:r>
-              <a:rPr b="0" lang="de-DE" sz="2800" spc="-1" strike="noStrike">
+              <a:rPr b="0" lang="de-DE" sz="1800" spc="-1" strike="noStrike">
                 <a:latin typeface="Arial"/>
               </a:rPr>
               <a:t>Zweite Gliederungsebene</a:t>
             </a:r>
-            <a:endParaRPr b="0" lang="de-DE" sz="2800" spc="-1" strike="noStrike">
+            <a:endParaRPr b="0" lang="de-DE" sz="1800" spc="-1" strike="noStrike">
               <a:latin typeface="Arial"/>
             </a:endParaRPr>
           </a:p>
@@ -2862,12 +3138,12 @@
               <a:buChar char=""/>
             </a:pPr>
             <a:r>
-              <a:rPr b="0" lang="de-DE" sz="2400" spc="-1" strike="noStrike">
+              <a:rPr b="0" lang="de-DE" sz="1800" spc="-1" strike="noStrike">
                 <a:latin typeface="Arial"/>
               </a:rPr>
               <a:t>Dritte Gliederungsebene</a:t>
             </a:r>
-            <a:endParaRPr b="0" lang="de-DE" sz="2400" spc="-1" strike="noStrike">
+            <a:endParaRPr b="0" lang="de-DE" sz="1800" spc="-1" strike="noStrike">
               <a:latin typeface="Arial"/>
             </a:endParaRPr>
           </a:p>
@@ -2884,12 +3160,12 @@
               <a:buChar char=""/>
             </a:pPr>
             <a:r>
-              <a:rPr b="0" lang="de-DE" sz="2000" spc="-1" strike="noStrike">
+              <a:rPr b="0" lang="de-DE" sz="1800" spc="-1" strike="noStrike">
                 <a:latin typeface="Arial"/>
               </a:rPr>
               <a:t>Vierte Gliederungsebene</a:t>
             </a:r>
-            <a:endParaRPr b="0" lang="de-DE" sz="2000" spc="-1" strike="noStrike">
+            <a:endParaRPr b="0" lang="de-DE" sz="1800" spc="-1" strike="noStrike">
               <a:latin typeface="Arial"/>
             </a:endParaRPr>
           </a:p>
@@ -2906,12 +3182,12 @@
               <a:buChar char=""/>
             </a:pPr>
             <a:r>
-              <a:rPr b="0" lang="de-DE" sz="2000" spc="-1" strike="noStrike">
+              <a:rPr b="0" lang="de-DE" sz="1800" spc="-1" strike="noStrike">
                 <a:latin typeface="Arial"/>
               </a:rPr>
               <a:t>Fünfte Gliederungsebene</a:t>
             </a:r>
-            <a:endParaRPr b="0" lang="de-DE" sz="2000" spc="-1" strike="noStrike">
+            <a:endParaRPr b="0" lang="de-DE" sz="1800" spc="-1" strike="noStrike">
               <a:latin typeface="Arial"/>
             </a:endParaRPr>
           </a:p>
@@ -2928,12 +3204,12 @@
               <a:buChar char=""/>
             </a:pPr>
             <a:r>
-              <a:rPr b="0" lang="de-DE" sz="2000" spc="-1" strike="noStrike">
+              <a:rPr b="0" lang="de-DE" sz="1800" spc="-1" strike="noStrike">
                 <a:latin typeface="Arial"/>
               </a:rPr>
               <a:t>Sechste Gliederungsebene</a:t>
             </a:r>
-            <a:endParaRPr b="0" lang="de-DE" sz="2000" spc="-1" strike="noStrike">
+            <a:endParaRPr b="0" lang="de-DE" sz="1800" spc="-1" strike="noStrike">
               <a:latin typeface="Arial"/>
             </a:endParaRPr>
           </a:p>
@@ -2950,12 +3226,12 @@
               <a:buChar char=""/>
             </a:pPr>
             <a:r>
-              <a:rPr b="0" lang="de-DE" sz="2000" spc="-1" strike="noStrike">
+              <a:rPr b="0" lang="de-DE" sz="1800" spc="-1" strike="noStrike">
                 <a:latin typeface="Arial"/>
               </a:rPr>
               <a:t>Siebte Gliederungsebene</a:t>
             </a:r>
-            <a:endParaRPr b="0" lang="de-DE" sz="2000" spc="-1" strike="noStrike">
+            <a:endParaRPr b="0" lang="de-DE" sz="1800" spc="-1" strike="noStrike">
               <a:latin typeface="Arial"/>
             </a:endParaRPr>
           </a:p>
@@ -3010,8 +3286,8 @@
         </p:nvSpPr>
         <p:spPr>
           <a:xfrm>
-            <a:off x="702000" y="696600"/>
-            <a:ext cx="6155280" cy="1785240"/>
+            <a:off x="377640" y="426240"/>
+            <a:ext cx="6803280" cy="1784880"/>
           </a:xfrm>
           <a:prstGeom prst="rect">
             <a:avLst/>
@@ -3019,16 +3295,17 @@
         </p:spPr>
         <p:txBody>
           <a:bodyPr lIns="0" rIns="0" tIns="0" bIns="0" anchor="ctr">
-            <a:spAutoFit/>
-          </a:bodyPr>
-          <a:p>
-            <a:r>
-              <a:rPr b="0" lang="de-DE" sz="1800" spc="-1" strike="noStrike">
+            <a:noAutofit/>
+          </a:bodyPr>
+          <a:p>
+            <a:pPr algn="ctr"/>
+            <a:r>
+              <a:rPr b="0" lang="de-DE" sz="4400" spc="-1" strike="noStrike">
                 <a:latin typeface="Arial"/>
               </a:rPr>
               <a:t>Format des Titeltextes durch Klicken bearbeiten</a:t>
             </a:r>
-            <a:endParaRPr b="0" lang="de-DE" sz="1800" spc="-1" strike="noStrike">
+            <a:endParaRPr b="0" lang="de-DE" sz="4400" spc="-1" strike="noStrike">
               <a:latin typeface="Arial"/>
             </a:endParaRPr>
           </a:p>
@@ -3046,8 +3323,8 @@
         </p:nvSpPr>
         <p:spPr>
           <a:xfrm>
-            <a:off x="702000" y="2692800"/>
-            <a:ext cx="6155280" cy="5782680"/>
+            <a:off x="377640" y="2501640"/>
+            <a:ext cx="6803280" cy="6200640"/>
           </a:xfrm>
           <a:prstGeom prst="rect">
             <a:avLst/>
@@ -3070,12 +3347,12 @@
               <a:buChar char=""/>
             </a:pPr>
             <a:r>
-              <a:rPr b="0" lang="de-DE" sz="1800" spc="-1" strike="noStrike">
+              <a:rPr b="0" lang="de-DE" sz="3200" spc="-1" strike="noStrike">
                 <a:latin typeface="Arial"/>
               </a:rPr>
               <a:t>Format des Gliederungstextes durch Klicken bearbeiten</a:t>
             </a:r>
-            <a:endParaRPr b="0" lang="de-DE" sz="1800" spc="-1" strike="noStrike">
+            <a:endParaRPr b="0" lang="de-DE" sz="3200" spc="-1" strike="noStrike">
               <a:latin typeface="Arial"/>
             </a:endParaRPr>
           </a:p>
@@ -3092,12 +3369,12 @@
               <a:buChar char=""/>
             </a:pPr>
             <a:r>
-              <a:rPr b="0" lang="de-DE" sz="1800" spc="-1" strike="noStrike">
+              <a:rPr b="0" lang="de-DE" sz="2800" spc="-1" strike="noStrike">
                 <a:latin typeface="Arial"/>
               </a:rPr>
               <a:t>Zweite Gliederungsebene</a:t>
             </a:r>
-            <a:endParaRPr b="0" lang="de-DE" sz="1800" spc="-1" strike="noStrike">
+            <a:endParaRPr b="0" lang="de-DE" sz="2800" spc="-1" strike="noStrike">
               <a:latin typeface="Arial"/>
             </a:endParaRPr>
           </a:p>
@@ -3114,12 +3391,12 @@
               <a:buChar char=""/>
             </a:pPr>
             <a:r>
-              <a:rPr b="0" lang="de-DE" sz="1800" spc="-1" strike="noStrike">
+              <a:rPr b="0" lang="de-DE" sz="2400" spc="-1" strike="noStrike">
                 <a:latin typeface="Arial"/>
               </a:rPr>
               <a:t>Dritte Gliederungsebene</a:t>
             </a:r>
-            <a:endParaRPr b="0" lang="de-DE" sz="1800" spc="-1" strike="noStrike">
+            <a:endParaRPr b="0" lang="de-DE" sz="2400" spc="-1" strike="noStrike">
               <a:latin typeface="Arial"/>
             </a:endParaRPr>
           </a:p>
@@ -3136,12 +3413,12 @@
               <a:buChar char=""/>
             </a:pPr>
             <a:r>
-              <a:rPr b="0" lang="de-DE" sz="1800" spc="-1" strike="noStrike">
+              <a:rPr b="0" lang="de-DE" sz="2000" spc="-1" strike="noStrike">
                 <a:latin typeface="Arial"/>
               </a:rPr>
               <a:t>Vierte Gliederungsebene</a:t>
             </a:r>
-            <a:endParaRPr b="0" lang="de-DE" sz="1800" spc="-1" strike="noStrike">
+            <a:endParaRPr b="0" lang="de-DE" sz="2000" spc="-1" strike="noStrike">
               <a:latin typeface="Arial"/>
             </a:endParaRPr>
           </a:p>
@@ -3158,12 +3435,12 @@
               <a:buChar char=""/>
             </a:pPr>
             <a:r>
-              <a:rPr b="0" lang="de-DE" sz="1800" spc="-1" strike="noStrike">
+              <a:rPr b="0" lang="de-DE" sz="2000" spc="-1" strike="noStrike">
                 <a:latin typeface="Arial"/>
               </a:rPr>
               <a:t>Fünfte Gliederungsebene</a:t>
             </a:r>
-            <a:endParaRPr b="0" lang="de-DE" sz="1800" spc="-1" strike="noStrike">
+            <a:endParaRPr b="0" lang="de-DE" sz="2000" spc="-1" strike="noStrike">
               <a:latin typeface="Arial"/>
             </a:endParaRPr>
           </a:p>
@@ -3180,12 +3457,12 @@
               <a:buChar char=""/>
             </a:pPr>
             <a:r>
-              <a:rPr b="0" lang="de-DE" sz="1800" spc="-1" strike="noStrike">
+              <a:rPr b="0" lang="de-DE" sz="2000" spc="-1" strike="noStrike">
                 <a:latin typeface="Arial"/>
               </a:rPr>
               <a:t>Sechste Gliederungsebene</a:t>
             </a:r>
-            <a:endParaRPr b="0" lang="de-DE" sz="1800" spc="-1" strike="noStrike">
+            <a:endParaRPr b="0" lang="de-DE" sz="2000" spc="-1" strike="noStrike">
               <a:latin typeface="Arial"/>
             </a:endParaRPr>
           </a:p>
@@ -3202,12 +3479,12 @@
               <a:buChar char=""/>
             </a:pPr>
             <a:r>
-              <a:rPr b="0" lang="de-DE" sz="1800" spc="-1" strike="noStrike">
+              <a:rPr b="0" lang="de-DE" sz="2000" spc="-1" strike="noStrike">
                 <a:latin typeface="Arial"/>
               </a:rPr>
               <a:t>Siebte Gliederungsebene</a:t>
             </a:r>
-            <a:endParaRPr b="0" lang="de-DE" sz="1800" spc="-1" strike="noStrike">
+            <a:endParaRPr b="0" lang="de-DE" sz="2000" spc="-1" strike="noStrike">
               <a:latin typeface="Arial"/>
             </a:endParaRPr>
           </a:p>
@@ -3259,7 +3536,7 @@
         <p:spPr>
           <a:xfrm>
             <a:off x="504000" y="760680"/>
-            <a:ext cx="6623640" cy="1250280"/>
+            <a:ext cx="6623280" cy="1249920"/>
           </a:xfrm>
           <a:prstGeom prst="rect">
             <a:avLst/>
@@ -3287,7 +3564,11 @@
             </a:pPr>
             <a:r>
               <a:rPr b="1" lang="de-DE" sz="2400" spc="-1" strike="noStrike">
-                <a:latin typeface="Arial"/>
+                <a:solidFill>
+                  <a:srgbClr val="000000"/>
+                </a:solidFill>
+                <a:latin typeface="Arial"/>
+                <a:ea typeface="DejaVu Sans"/>
               </a:rPr>
               <a:t>Results of Jörg (Questions 4 and 9)</a:t>
             </a:r>
@@ -3295,11 +3576,178 @@
             <a:br/>
             <a:r>
               <a:rPr b="0" lang="de-DE" sz="2000" spc="-1" strike="noStrike">
-                <a:latin typeface="Arial"/>
-              </a:rPr>
-              <a:t>Q4: How did the unit water footprint (uWF) change within the last 15 years of data (2001-2016)?</a:t>
+                <a:solidFill>
+                  <a:srgbClr val="000000"/>
+                </a:solidFill>
+                <a:latin typeface="Arial"/>
+                <a:ea typeface="DejaVu Sans"/>
+              </a:rPr>
+              <a:t>Q4: How did the unit water footprint (uWF) change within the last 15 years of data (2000-2015)?</a:t>
             </a:r>
             <a:endParaRPr b="0" lang="de-DE" sz="2000" spc="-1" strike="noStrike">
+              <a:latin typeface="Arial"/>
+            </a:endParaRPr>
+          </a:p>
+        </p:txBody>
+      </p:sp>
+      <p:sp>
+        <p:nvSpPr>
+          <p:cNvPr id="77" name="CustomShape 2"/>
+          <p:cNvSpPr/>
+          <p:nvPr/>
+        </p:nvSpPr>
+        <p:spPr>
+          <a:xfrm>
+            <a:off x="720000" y="2093040"/>
+            <a:ext cx="6402600" cy="1642320"/>
+          </a:xfrm>
+          <a:prstGeom prst="rect">
+            <a:avLst/>
+          </a:prstGeom>
+          <a:noFill/>
+          <a:ln>
+            <a:noFill/>
+          </a:ln>
+        </p:spPr>
+        <p:style>
+          <a:lnRef idx="0"/>
+          <a:fillRef idx="0"/>
+          <a:effectRef idx="0"/>
+          <a:fontRef idx="minor"/>
+        </p:style>
+        <p:txBody>
+          <a:bodyPr lIns="0" rIns="0" tIns="0" bIns="0">
+            <a:spAutoFit/>
+          </a:bodyPr>
+          <a:p>
+            <a:pPr>
+              <a:lnSpc>
+                <a:spcPct val="115000"/>
+              </a:lnSpc>
+            </a:pPr>
+            <a:r>
+              <a:rPr b="0" lang="de-DE" sz="1600" spc="-1" strike="noStrike">
+                <a:solidFill>
+                  <a:srgbClr val="000000"/>
+                </a:solidFill>
+                <a:latin typeface="Arial"/>
+                <a:ea typeface="Noto Sans CJK SC Regular"/>
+              </a:rPr>
+              <a:t>+ uWF </a:t>
+            </a:r>
+            <a:r>
+              <a:rPr b="1" lang="de-DE" sz="1600" spc="-1" strike="noStrike">
+                <a:solidFill>
+                  <a:srgbClr val="000000"/>
+                </a:solidFill>
+                <a:latin typeface="Arial"/>
+                <a:ea typeface="Noto Sans CJK SC Regular"/>
+              </a:rPr>
+              <a:t>decreases</a:t>
+            </a:r>
+            <a:r>
+              <a:rPr b="0" lang="de-DE" sz="1600" spc="-1" strike="noStrike">
+                <a:solidFill>
+                  <a:srgbClr val="000000"/>
+                </a:solidFill>
+                <a:latin typeface="Arial"/>
+                <a:ea typeface="Noto Sans CJK SC Regular"/>
+              </a:rPr>
+              <a:t> in most cases (62</a:t>
+            </a:r>
+            <a:r>
+              <a:rPr b="1" lang="de-DE" sz="1600" spc="-1" strike="noStrike">
+                <a:solidFill>
+                  <a:srgbClr val="000000"/>
+                </a:solidFill>
+                <a:latin typeface="Arial"/>
+                <a:ea typeface="Noto Sans CJK SC Regular"/>
+              </a:rPr>
+              <a:t>%</a:t>
+            </a:r>
+            <a:r>
+              <a:rPr b="0" lang="de-DE" sz="1600" spc="-1" strike="noStrike">
+                <a:solidFill>
+                  <a:srgbClr val="000000"/>
+                </a:solidFill>
+                <a:latin typeface="Arial"/>
+                <a:ea typeface="Noto Sans CJK SC Regular"/>
+              </a:rPr>
+              <a:t>) of all 15 products in 14 countries considered within the last 15 years.</a:t>
+            </a:r>
+            <a:br/>
+            <a:r>
+              <a:rPr b="0" lang="de-DE" sz="1600" spc="-1" strike="noStrike">
+                <a:solidFill>
+                  <a:srgbClr val="000000"/>
+                </a:solidFill>
+                <a:latin typeface="Arial"/>
+                <a:ea typeface="Noto Sans CJK SC Regular"/>
+              </a:rPr>
+              <a:t>+ uWF of tomatoes, maize, pears and apples </a:t>
+            </a:r>
+            <a:r>
+              <a:rPr b="1" lang="de-DE" sz="1600" spc="-1" strike="noStrike">
+                <a:solidFill>
+                  <a:srgbClr val="000000"/>
+                </a:solidFill>
+                <a:latin typeface="Arial"/>
+                <a:ea typeface="Noto Sans CJK SC Regular"/>
+              </a:rPr>
+              <a:t>decrease</a:t>
+            </a:r>
+            <a:r>
+              <a:rPr b="0" lang="de-DE" sz="1600" spc="-1" strike="noStrike">
+                <a:solidFill>
+                  <a:srgbClr val="000000"/>
+                </a:solidFill>
+                <a:latin typeface="Arial"/>
+                <a:ea typeface="Noto Sans CJK SC Regular"/>
+              </a:rPr>
+              <a:t> </a:t>
+            </a:r>
+            <a:r>
+              <a:rPr b="1" lang="de-DE" sz="1600" spc="-1" strike="noStrike">
+                <a:solidFill>
+                  <a:srgbClr val="000000"/>
+                </a:solidFill>
+                <a:latin typeface="Arial"/>
+                <a:ea typeface="Noto Sans CJK SC Regular"/>
+              </a:rPr>
+              <a:t>most consistently </a:t>
+            </a:r>
+            <a:r>
+              <a:rPr b="0" lang="de-DE" sz="1600" spc="-1" strike="noStrike">
+                <a:solidFill>
+                  <a:srgbClr val="000000"/>
+                </a:solidFill>
+                <a:latin typeface="Arial"/>
+                <a:ea typeface="Noto Sans CJK SC Regular"/>
+              </a:rPr>
+              <a:t>in almost all countries while pumpkins, cherries and grapes </a:t>
+            </a:r>
+            <a:r>
+              <a:rPr b="1" lang="de-DE" sz="1600" spc="-1" strike="noStrike">
+                <a:solidFill>
+                  <a:srgbClr val="000000"/>
+                </a:solidFill>
+                <a:latin typeface="Arial"/>
+                <a:ea typeface="Noto Sans CJK SC Regular"/>
+              </a:rPr>
+              <a:t>increase</a:t>
+            </a:r>
+            <a:r>
+              <a:rPr b="0" lang="de-DE" sz="1600" spc="-1" strike="noStrike">
+                <a:solidFill>
+                  <a:srgbClr val="000000"/>
+                </a:solidFill>
+                <a:latin typeface="Arial"/>
+                <a:ea typeface="Noto Sans CJK SC Regular"/>
+              </a:rPr>
+              <a:t> in at least 5 of the countries considered.</a:t>
+            </a:r>
+            <a:br/>
+            <a:endParaRPr b="0" lang="de-DE" sz="1600" spc="-1" strike="noStrike">
               <a:latin typeface="Arial"/>
             </a:endParaRPr>
           </a:p>
@@ -3307,7 +3755,7 @@
       </p:sp>
       <p:pic>
         <p:nvPicPr>
-          <p:cNvPr id="77" name="" descr=""/>
+          <p:cNvPr id="78" name="" descr=""/>
           <p:cNvPicPr/>
           <p:nvPr/>
         </p:nvPicPr>
@@ -3317,8 +3765,8 @@
         </p:blipFill>
         <p:spPr>
           <a:xfrm>
-            <a:off x="389880" y="4189320"/>
-            <a:ext cx="6839280" cy="4647600"/>
+            <a:off x="180000" y="4005720"/>
+            <a:ext cx="7229880" cy="5045760"/>
           </a:xfrm>
           <a:prstGeom prst="rect">
             <a:avLst/>
@@ -3328,133 +3776,6 @@
           </a:ln>
         </p:spPr>
       </p:pic>
-      <p:sp>
-        <p:nvSpPr>
-          <p:cNvPr id="78" name="CustomShape 2"/>
-          <p:cNvSpPr/>
-          <p:nvPr/>
-        </p:nvSpPr>
-        <p:spPr>
-          <a:xfrm>
-            <a:off x="720000" y="2093040"/>
-            <a:ext cx="6402960" cy="1921320"/>
-          </a:xfrm>
-          <a:prstGeom prst="rect">
-            <a:avLst/>
-          </a:prstGeom>
-          <a:noFill/>
-          <a:ln>
-            <a:noFill/>
-          </a:ln>
-        </p:spPr>
-        <p:style>
-          <a:lnRef idx="0"/>
-          <a:fillRef idx="0"/>
-          <a:effectRef idx="0"/>
-          <a:fontRef idx="minor"/>
-        </p:style>
-        <p:txBody>
-          <a:bodyPr lIns="0" rIns="0" tIns="0" bIns="0">
-            <a:spAutoFit/>
-          </a:bodyPr>
-          <a:p>
-            <a:pPr>
-              <a:lnSpc>
-                <a:spcPct val="115000"/>
-              </a:lnSpc>
-            </a:pPr>
-            <a:r>
-              <a:rPr b="0" lang="de-DE" sz="1600" spc="-1" strike="noStrike">
-                <a:latin typeface="Arial"/>
-                <a:ea typeface="Noto Sans CJK SC Regular"/>
-              </a:rPr>
-              <a:t>+ uWF </a:t>
-            </a:r>
-            <a:r>
-              <a:rPr b="1" lang="de-DE" sz="1600" spc="-1" strike="noStrike">
-                <a:latin typeface="Arial"/>
-                <a:ea typeface="Noto Sans CJK SC Regular"/>
-              </a:rPr>
-              <a:t>decreases</a:t>
-            </a:r>
-            <a:r>
-              <a:rPr b="0" lang="de-DE" sz="1600" spc="-1" strike="noStrike">
-                <a:latin typeface="Arial"/>
-                <a:ea typeface="Noto Sans CJK SC Regular"/>
-              </a:rPr>
-              <a:t> in most cases (</a:t>
-            </a:r>
-            <a:r>
-              <a:rPr b="1" lang="de-DE" sz="1600" spc="-1" strike="noStrike">
-                <a:latin typeface="Arial"/>
-                <a:ea typeface="Noto Sans CJK SC Regular"/>
-              </a:rPr>
-              <a:t>76%</a:t>
-            </a:r>
-            <a:r>
-              <a:rPr b="0" lang="de-DE" sz="1600" spc="-1" strike="noStrike">
-                <a:latin typeface="Arial"/>
-                <a:ea typeface="Noto Sans CJK SC Regular"/>
-              </a:rPr>
-              <a:t>) of all 15 products in all 15 countries considered within the last 15 years.</a:t>
-            </a:r>
-            <a:br/>
-            <a:r>
-              <a:rPr b="0" lang="de-DE" sz="1600" spc="-1" strike="noStrike">
-                <a:latin typeface="Arial"/>
-                <a:ea typeface="Noto Sans CJK SC Regular"/>
-              </a:rPr>
-              <a:t>+ uWF of potatoes, tomatoes, maize, carrots, chilies and apples </a:t>
-            </a:r>
-            <a:r>
-              <a:rPr b="1" lang="de-DE" sz="1600" spc="-1" strike="noStrike">
-                <a:latin typeface="Arial"/>
-                <a:ea typeface="Noto Sans CJK SC Regular"/>
-              </a:rPr>
-              <a:t>decrease</a:t>
-            </a:r>
-            <a:r>
-              <a:rPr b="0" lang="de-DE" sz="1600" spc="-1" strike="noStrike">
-                <a:latin typeface="Arial"/>
-                <a:ea typeface="Noto Sans CJK SC Regular"/>
-              </a:rPr>
-              <a:t> </a:t>
-            </a:r>
-            <a:r>
-              <a:rPr b="1" lang="de-DE" sz="1600" spc="-1" strike="noStrike">
-                <a:latin typeface="Arial"/>
-                <a:ea typeface="Noto Sans CJK SC Regular"/>
-              </a:rPr>
-              <a:t>most consistently </a:t>
-            </a:r>
-            <a:r>
-              <a:rPr b="0" lang="de-DE" sz="1600" spc="-1" strike="noStrike">
-                <a:latin typeface="Arial"/>
-                <a:ea typeface="Noto Sans CJK SC Regular"/>
-              </a:rPr>
-              <a:t>in almost all countries while pumpkins, mushrooms and lettuce </a:t>
-            </a:r>
-            <a:r>
-              <a:rPr b="1" lang="de-DE" sz="1600" spc="-1" strike="noStrike">
-                <a:latin typeface="Arial"/>
-                <a:ea typeface="Noto Sans CJK SC Regular"/>
-              </a:rPr>
-              <a:t>increase</a:t>
-            </a:r>
-            <a:r>
-              <a:rPr b="0" lang="de-DE" sz="1600" spc="-1" strike="noStrike">
-                <a:latin typeface="Arial"/>
-                <a:ea typeface="Noto Sans CJK SC Regular"/>
-              </a:rPr>
-              <a:t> in at least half of the countries considered.</a:t>
-            </a:r>
-            <a:br/>
-            <a:endParaRPr b="0" lang="de-DE" sz="1600" spc="-1" strike="noStrike">
-              <a:latin typeface="Arial"/>
-            </a:endParaRPr>
-          </a:p>
-        </p:txBody>
-      </p:sp>
     </p:spTree>
   </p:cSld>
   <mc:AlternateContent>
@@ -3521,7 +3842,7 @@
         <p:spPr>
           <a:xfrm>
             <a:off x="497520" y="833040"/>
-            <a:ext cx="6616080" cy="3356280"/>
+            <a:ext cx="6615720" cy="3915720"/>
           </a:xfrm>
           <a:prstGeom prst="rect">
             <a:avLst/>
@@ -3549,14 +3870,20 @@
             </a:pPr>
             <a:r>
               <a:rPr b="0" lang="de-DE" sz="1600" spc="-1" strike="noStrike">
+                <a:solidFill>
+                  <a:srgbClr val="000000"/>
+                </a:solidFill>
                 <a:latin typeface="Arial"/>
                 <a:ea typeface="Noto Sans CJK SC Regular"/>
               </a:rPr>
-              <a:t>+ From 1960-2016, uWF changes vary dramatically among countries and products. Nevertheless, a few typical patterns can be observed:</a:t>
+              <a:t>+ From 1960-2016, uWF changes dramatically among some countries and products. Nevertheless, a few typical patterns can be observed:</a:t>
             </a:r>
             <a:br/>
             <a:r>
               <a:rPr b="0" lang="de-DE" sz="1600" spc="-1" strike="noStrike">
+                <a:solidFill>
+                  <a:srgbClr val="000000"/>
+                </a:solidFill>
                 <a:latin typeface="Arial"/>
                 <a:ea typeface="Noto Sans CJK SC Regular"/>
               </a:rPr>
@@ -3564,6 +3891,9 @@
             </a:r>
             <a:r>
               <a:rPr b="0" lang="de-DE" sz="1600" spc="-1" strike="noStrike">
+                <a:solidFill>
+                  <a:srgbClr val="000000"/>
+                </a:solidFill>
                 <a:latin typeface="Arial"/>
                 <a:ea typeface="Noto Sans CJK SC Regular"/>
               </a:rPr>
@@ -3571,6 +3901,9 @@
             </a:r>
             <a:r>
               <a:rPr b="1" lang="de-DE" sz="1600" spc="-1" strike="noStrike">
+                <a:solidFill>
+                  <a:srgbClr val="000000"/>
+                </a:solidFill>
                 <a:latin typeface="Arial"/>
                 <a:ea typeface="Noto Sans CJK SC Regular"/>
               </a:rPr>
@@ -3578,6 +3911,9 @@
             </a:r>
             <a:r>
               <a:rPr b="0" lang="de-DE" sz="1600" spc="-1" strike="noStrike">
+                <a:solidFill>
+                  <a:srgbClr val="000000"/>
+                </a:solidFill>
                 <a:latin typeface="Arial"/>
                 <a:ea typeface="Noto Sans CJK SC Regular"/>
               </a:rPr>
@@ -3586,6 +3922,9 @@
             <a:br/>
             <a:r>
               <a:rPr b="0" lang="de-DE" sz="1600" spc="-1" strike="noStrike">
+                <a:solidFill>
+                  <a:srgbClr val="000000"/>
+                </a:solidFill>
                 <a:latin typeface="Arial"/>
                 <a:ea typeface="Noto Sans CJK SC Regular"/>
               </a:rPr>
@@ -3593,6 +3932,9 @@
             </a:r>
             <a:r>
               <a:rPr b="0" lang="de-DE" sz="1600" spc="-1" strike="noStrike">
+                <a:solidFill>
+                  <a:srgbClr val="000000"/>
+                </a:solidFill>
                 <a:latin typeface="Arial"/>
                 <a:ea typeface="Noto Sans CJK SC Regular"/>
               </a:rPr>
@@ -3600,6 +3942,9 @@
             </a:r>
             <a:r>
               <a:rPr b="1" lang="de-DE" sz="1600" spc="-1" strike="noStrike">
+                <a:solidFill>
+                  <a:srgbClr val="000000"/>
+                </a:solidFill>
                 <a:latin typeface="Arial"/>
                 <a:ea typeface="Noto Sans CJK SC Regular"/>
               </a:rPr>
@@ -3607,14 +3952,20 @@
             </a:r>
             <a:r>
               <a:rPr b="0" lang="de-DE" sz="1600" spc="-1" strike="noStrike">
+                <a:solidFill>
+                  <a:srgbClr val="000000"/>
+                </a:solidFill>
                 <a:latin typeface="Arial"/>
                 <a:ea typeface="Noto Sans CJK SC Regular"/>
               </a:rPr>
-              <a:t> uWF (unknown reasons); </a:t>
+              <a:t> uWF (e.g. grapes, cherries); </a:t>
             </a:r>
             <a:br/>
             <a:r>
               <a:rPr b="0" lang="de-DE" sz="1600" spc="-1" strike="noStrike">
+                <a:solidFill>
+                  <a:srgbClr val="000000"/>
+                </a:solidFill>
                 <a:latin typeface="Arial"/>
                 <a:ea typeface="Noto Sans CJK SC Regular"/>
               </a:rPr>
@@ -3622,6 +3973,9 @@
             </a:r>
             <a:r>
               <a:rPr b="0" lang="de-DE" sz="1600" spc="-1" strike="noStrike">
+                <a:solidFill>
+                  <a:srgbClr val="000000"/>
+                </a:solidFill>
                 <a:latin typeface="Arial"/>
                 <a:ea typeface="Noto Sans CJK SC Regular"/>
               </a:rPr>
@@ -3629,6 +3983,9 @@
             </a:r>
             <a:r>
               <a:rPr b="1" lang="de-DE" sz="1600" spc="-1" strike="noStrike">
+                <a:solidFill>
+                  <a:srgbClr val="000000"/>
+                </a:solidFill>
                 <a:latin typeface="Arial"/>
                 <a:ea typeface="Noto Sans CJK SC Regular"/>
               </a:rPr>
@@ -3636,28 +3993,60 @@
             </a:r>
             <a:r>
               <a:rPr b="0" lang="de-DE" sz="1600" spc="-1" strike="noStrike">
+                <a:solidFill>
+                  <a:srgbClr val="000000"/>
+                </a:solidFill>
                 <a:latin typeface="Arial"/>
                 <a:ea typeface="Noto Sans CJK SC Regular"/>
               </a:rPr>
-              <a:t> uWF over many years, some </a:t>
+              <a:t> uWF over many years until </a:t>
             </a:r>
             <a:r>
               <a:rPr b="1" lang="de-DE" sz="1600" spc="-1" strike="noStrike">
+                <a:solidFill>
+                  <a:srgbClr val="000000"/>
+                </a:solidFill>
                 <a:latin typeface="Arial"/>
                 <a:ea typeface="Noto Sans CJK SC Regular"/>
               </a:rPr>
-              <a:t>decline suddenly</a:t>
+              <a:t>sudden</a:t>
             </a:r>
             <a:r>
               <a:rPr b="0" lang="de-DE" sz="1600" spc="-1" strike="noStrike">
+                <a:solidFill>
+                  <a:srgbClr val="000000"/>
+                </a:solidFill>
                 <a:latin typeface="Arial"/>
                 <a:ea typeface="Noto Sans CJK SC Regular"/>
               </a:rPr>
+              <a:t> </a:t>
+            </a:r>
+            <a:r>
+              <a:rPr b="1" lang="de-DE" sz="1600" spc="-1" strike="noStrike">
+                <a:solidFill>
+                  <a:srgbClr val="000000"/>
+                </a:solidFill>
+                <a:latin typeface="Arial"/>
+                <a:ea typeface="Noto Sans CJK SC Regular"/>
+              </a:rPr>
+              <a:t>decline</a:t>
+            </a:r>
+            <a:r>
+              <a:rPr b="0" lang="de-DE" sz="1600" spc="-1" strike="noStrike">
+                <a:solidFill>
+                  <a:srgbClr val="000000"/>
+                </a:solidFill>
+                <a:latin typeface="Arial"/>
+                <a:ea typeface="Noto Sans CJK SC Regular"/>
+              </a:rPr>
               <a:t>; </a:t>
             </a:r>
             <a:br/>
             <a:r>
               <a:rPr b="0" lang="de-DE" sz="1600" spc="-1" strike="noStrike">
+                <a:solidFill>
+                  <a:srgbClr val="000000"/>
+                </a:solidFill>
                 <a:latin typeface="Arial"/>
                 <a:ea typeface="Noto Sans CJK SC Regular"/>
               </a:rPr>
@@ -3665,6 +4054,9 @@
             </a:r>
             <a:r>
               <a:rPr b="0" lang="de-DE" sz="1600" spc="-1" strike="noStrike">
+                <a:solidFill>
+                  <a:srgbClr val="000000"/>
+                </a:solidFill>
                 <a:latin typeface="Arial"/>
                 <a:ea typeface="Noto Sans CJK SC Regular"/>
               </a:rPr>
@@ -3672,6 +4064,9 @@
             </a:r>
             <a:r>
               <a:rPr b="1" lang="de-DE" sz="1600" spc="-1" strike="noStrike">
+                <a:solidFill>
+                  <a:srgbClr val="000000"/>
+                </a:solidFill>
                 <a:latin typeface="Arial"/>
                 <a:ea typeface="Noto Sans CJK SC Regular"/>
               </a:rPr>
@@ -3679,6 +4074,9 @@
             </a:r>
             <a:r>
               <a:rPr b="0" lang="de-DE" sz="1600" spc="-1" strike="noStrike">
+                <a:solidFill>
+                  <a:srgbClr val="000000"/>
+                </a:solidFill>
                 <a:latin typeface="Arial"/>
                 <a:ea typeface="Noto Sans CJK SC Regular"/>
               </a:rPr>
@@ -3687,6 +4085,9 @@
             <a:br/>
             <a:r>
               <a:rPr b="0" lang="de-DE" sz="1600" spc="-1" strike="noStrike">
+                <a:solidFill>
+                  <a:srgbClr val="000000"/>
+                </a:solidFill>
                 <a:latin typeface="Arial"/>
                 <a:ea typeface="Noto Sans CJK SC Regular"/>
               </a:rPr>
@@ -3694,6 +4095,9 @@
             </a:r>
             <a:r>
               <a:rPr b="1" lang="de-DE" sz="1600" spc="-1" strike="noStrike">
+                <a:solidFill>
+                  <a:srgbClr val="000000"/>
+                </a:solidFill>
                 <a:latin typeface="Arial"/>
                 <a:ea typeface="Noto Sans CJK SC Regular"/>
               </a:rPr>
@@ -3701,10 +4105,13 @@
             </a:r>
             <a:r>
               <a:rPr b="0" lang="de-DE" sz="1600" spc="-1" strike="noStrike">
+                <a:solidFill>
+                  <a:srgbClr val="000000"/>
+                </a:solidFill>
                 <a:latin typeface="Arial"/>
                 <a:ea typeface="Noto Sans CJK SC Regular"/>
               </a:rPr>
-              <a:t> (&gt; 10,000 l/kg) occur for few products/countries (e.g., grapes in Netherlands, maize in Marocco) that could be considered outliers/erroneous data; but: lack of knowledge!</a:t>
+              <a:t> (&gt; 10,000 l/kg) occur for few products/countries (e.g., grapes in Netherlands, maize in Marocco) that could be considered outliers/erroneous data; but: lack of knowledge! (some could be excluded using the 5th percentile of the item weight as lower limit; these values are considered unrepresentative for uWF)</a:t>
             </a:r>
             <a:endParaRPr b="0" lang="de-DE" sz="1600" spc="-1" strike="noStrike">
               <a:latin typeface="Arial"/>
@@ -3718,6 +4125,9 @@
             </a:pPr>
             <a:r>
               <a:rPr b="0" lang="de-DE" sz="1600" spc="-1" strike="noStrike">
+                <a:solidFill>
+                  <a:srgbClr val="000000"/>
+                </a:solidFill>
                 <a:latin typeface="Arial"/>
                 <a:ea typeface="Noto Sans CJK SC Regular"/>
               </a:rPr>
@@ -3742,7 +4152,7 @@
         </p:blipFill>
         <p:spPr>
           <a:xfrm>
-            <a:off x="30240" y="4312440"/>
+            <a:off x="30600" y="5028480"/>
             <a:ext cx="7559280" cy="4195800"/>
           </a:xfrm>
           <a:prstGeom prst="rect">
@@ -3819,7 +4229,7 @@
         <p:spPr>
           <a:xfrm>
             <a:off x="499320" y="293760"/>
-            <a:ext cx="6623640" cy="610200"/>
+            <a:ext cx="6623280" cy="609840"/>
           </a:xfrm>
           <a:prstGeom prst="rect">
             <a:avLst/>
@@ -3847,7 +4257,11 @@
             </a:pPr>
             <a:r>
               <a:rPr b="0" lang="de-DE" sz="2000" spc="-1" strike="noStrike">
-                <a:latin typeface="Arial"/>
+                <a:solidFill>
+                  <a:srgbClr val="000000"/>
+                </a:solidFill>
+                <a:latin typeface="Arial"/>
+                <a:ea typeface="DejaVu Sans"/>
               </a:rPr>
               <a:t>Q9: How is the unit water footprint (uWF) distributed among the different products/countries over time?</a:t>
             </a:r>
@@ -3866,7 +4280,7 @@
         <p:spPr>
           <a:xfrm>
             <a:off x="720000" y="977400"/>
-            <a:ext cx="6393600" cy="1677960"/>
+            <a:ext cx="6393240" cy="1677960"/>
           </a:xfrm>
           <a:prstGeom prst="rect">
             <a:avLst/>
@@ -3894,6 +4308,9 @@
             </a:pPr>
             <a:r>
               <a:rPr b="0" lang="de-DE" sz="1600" spc="-1" strike="noStrike">
+                <a:solidFill>
+                  <a:srgbClr val="000000"/>
+                </a:solidFill>
                 <a:latin typeface="Arial"/>
                 <a:ea typeface="Noto Sans CJK SC Regular"/>
               </a:rPr>
@@ -3911,17 +4328,13 @@
             </a:pPr>
             <a:r>
               <a:rPr b="0" lang="de-DE" sz="1600" spc="-1" strike="noStrike">
+                <a:solidFill>
+                  <a:srgbClr val="000000"/>
+                </a:solidFill>
                 <a:latin typeface="Arial"/>
                 <a:ea typeface="Noto Sans CJK SC Regular"/>
               </a:rPr>
-              <a:t>+ uWF varies strongly (sdev &gt; 500 l/kg) for some products, such as cherries, asparagus, maize while other products hardly vary in their uWF (sdev &lt; 100 l/kg) </a:t>
-            </a:r>
-            <a:r>
-              <a:rPr b="0" lang="de-DE" sz="1600" spc="-1" strike="noStrike">
-                <a:latin typeface="Arial"/>
-                <a:ea typeface="Noto Sans CJK SC Regular"/>
-              </a:rPr>
-              <a:t>such as potatoes, lettuce, chilies (see below).</a:t>
+              <a:t>+ uWF varies strongly (sdev &gt; 500 l/kg) for some products, such as cherries, asparagus, maize while other products hardly vary in their uWF (sdev &lt; 100 l/kg) such as potatoes, lettuce, chilies (see below).</a:t>
             </a:r>
             <a:endParaRPr b="0" lang="de-DE" sz="1600" spc="-1" strike="noStrike">
               <a:latin typeface="Arial"/>
@@ -3935,6 +4348,9 @@
             </a:pPr>
             <a:r>
               <a:rPr b="0" lang="de-DE" sz="1600" spc="-1" strike="noStrike">
+                <a:solidFill>
+                  <a:srgbClr val="000000"/>
+                </a:solidFill>
                 <a:latin typeface="Arial"/>
                 <a:ea typeface="Noto Sans CJK SC Regular"/>
               </a:rPr>
@@ -3958,8 +4374,8 @@
         </p:blipFill>
         <p:spPr>
           <a:xfrm>
-            <a:off x="36000" y="3880080"/>
-            <a:ext cx="7481520" cy="6341400"/>
+            <a:off x="137160" y="3456000"/>
+            <a:ext cx="7272720" cy="6298560"/>
           </a:xfrm>
           <a:prstGeom prst="rect">
             <a:avLst/>
@@ -4038,8 +4454,8 @@
         </p:blipFill>
         <p:spPr>
           <a:xfrm>
-            <a:off x="396000" y="52560"/>
-            <a:ext cx="6727680" cy="10639440"/>
+            <a:off x="973800" y="144000"/>
+            <a:ext cx="5864040" cy="10353600"/>
           </a:xfrm>
           <a:prstGeom prst="rect">
             <a:avLst/>
@@ -4108,14 +4524,14 @@
       </p:grpSpPr>
       <p:sp>
         <p:nvSpPr>
-          <p:cNvPr id="85" name="TextShape 1"/>
-          <p:cNvSpPr txBox="1"/>
+          <p:cNvPr id="85" name="CustomShape 1"/>
+          <p:cNvSpPr/>
           <p:nvPr/>
         </p:nvSpPr>
         <p:spPr>
           <a:xfrm>
             <a:off x="702000" y="696600"/>
-            <a:ext cx="6155280" cy="1785240"/>
+            <a:ext cx="6154920" cy="1784880"/>
           </a:xfrm>
           <a:prstGeom prst="rect">
             <a:avLst/>
@@ -4125,17 +4541,12 @@
             <a:noFill/>
           </a:ln>
         </p:spPr>
-        <p:txBody>
-          <a:bodyPr lIns="0" rIns="0" tIns="0" bIns="0" anchor="ctr">
-            <a:spAutoFit/>
-          </a:bodyPr>
-          <a:p>
-            <a:pPr algn="ctr"/>
-            <a:endParaRPr b="0" lang="de-DE" sz="4400" spc="-1" strike="noStrike">
-              <a:latin typeface="Arial"/>
-            </a:endParaRPr>
-          </a:p>
-        </p:txBody>
+        <p:style>
+          <a:lnRef idx="0"/>
+          <a:fillRef idx="0"/>
+          <a:effectRef idx="0"/>
+          <a:fontRef idx="minor"/>
+        </p:style>
       </p:sp>
       <p:pic>
         <p:nvPicPr>
@@ -4149,8 +4560,8 @@
         </p:blipFill>
         <p:spPr>
           <a:xfrm>
-            <a:off x="540000" y="81720"/>
-            <a:ext cx="6660360" cy="10553760"/>
+            <a:off x="725760" y="184680"/>
+            <a:ext cx="6114240" cy="10414440"/>
           </a:xfrm>
           <a:prstGeom prst="rect">
             <a:avLst/>

</xml_diff>